<commit_message>
Minor updates to Design Patterns material
Also added NaiveRPGV3 project
</commit_message>
<xml_diff>
--- a/Chap/OOProg03/Presentations/Adapter.pptx
+++ b/Chap/OOProg03/Presentations/Adapter.pptx
@@ -265,7 +265,7 @@
           <a:p>
             <a:fld id="{E15B7D8E-2A20-4C0E-991C-872DBB7459A8}" type="datetimeFigureOut">
               <a:rPr lang="da-DK" smtClean="0"/>
-              <a:t>17-04-2018</a:t>
+              <a:t>04-11-2018</a:t>
             </a:fld>
             <a:endParaRPr lang="da-DK"/>
           </a:p>
@@ -435,7 +435,7 @@
           <a:p>
             <a:fld id="{E15B7D8E-2A20-4C0E-991C-872DBB7459A8}" type="datetimeFigureOut">
               <a:rPr lang="da-DK" smtClean="0"/>
-              <a:t>17-04-2018</a:t>
+              <a:t>04-11-2018</a:t>
             </a:fld>
             <a:endParaRPr lang="da-DK"/>
           </a:p>
@@ -615,7 +615,7 @@
           <a:p>
             <a:fld id="{E15B7D8E-2A20-4C0E-991C-872DBB7459A8}" type="datetimeFigureOut">
               <a:rPr lang="da-DK" smtClean="0"/>
-              <a:t>17-04-2018</a:t>
+              <a:t>04-11-2018</a:t>
             </a:fld>
             <a:endParaRPr lang="da-DK"/>
           </a:p>
@@ -785,7 +785,7 @@
           <a:p>
             <a:fld id="{E15B7D8E-2A20-4C0E-991C-872DBB7459A8}" type="datetimeFigureOut">
               <a:rPr lang="da-DK" smtClean="0"/>
-              <a:t>17-04-2018</a:t>
+              <a:t>04-11-2018</a:t>
             </a:fld>
             <a:endParaRPr lang="da-DK"/>
           </a:p>
@@ -1031,7 +1031,7 @@
           <a:p>
             <a:fld id="{E15B7D8E-2A20-4C0E-991C-872DBB7459A8}" type="datetimeFigureOut">
               <a:rPr lang="da-DK" smtClean="0"/>
-              <a:t>17-04-2018</a:t>
+              <a:t>04-11-2018</a:t>
             </a:fld>
             <a:endParaRPr lang="da-DK"/>
           </a:p>
@@ -1263,7 +1263,7 @@
           <a:p>
             <a:fld id="{E15B7D8E-2A20-4C0E-991C-872DBB7459A8}" type="datetimeFigureOut">
               <a:rPr lang="da-DK" smtClean="0"/>
-              <a:t>17-04-2018</a:t>
+              <a:t>04-11-2018</a:t>
             </a:fld>
             <a:endParaRPr lang="da-DK"/>
           </a:p>
@@ -1630,7 +1630,7 @@
           <a:p>
             <a:fld id="{E15B7D8E-2A20-4C0E-991C-872DBB7459A8}" type="datetimeFigureOut">
               <a:rPr lang="da-DK" smtClean="0"/>
-              <a:t>17-04-2018</a:t>
+              <a:t>04-11-2018</a:t>
             </a:fld>
             <a:endParaRPr lang="da-DK"/>
           </a:p>
@@ -1748,7 +1748,7 @@
           <a:p>
             <a:fld id="{E15B7D8E-2A20-4C0E-991C-872DBB7459A8}" type="datetimeFigureOut">
               <a:rPr lang="da-DK" smtClean="0"/>
-              <a:t>17-04-2018</a:t>
+              <a:t>04-11-2018</a:t>
             </a:fld>
             <a:endParaRPr lang="da-DK"/>
           </a:p>
@@ -1843,7 +1843,7 @@
           <a:p>
             <a:fld id="{E15B7D8E-2A20-4C0E-991C-872DBB7459A8}" type="datetimeFigureOut">
               <a:rPr lang="da-DK" smtClean="0"/>
-              <a:t>17-04-2018</a:t>
+              <a:t>04-11-2018</a:t>
             </a:fld>
             <a:endParaRPr lang="da-DK"/>
           </a:p>
@@ -2120,7 +2120,7 @@
           <a:p>
             <a:fld id="{E15B7D8E-2A20-4C0E-991C-872DBB7459A8}" type="datetimeFigureOut">
               <a:rPr lang="da-DK" smtClean="0"/>
-              <a:t>17-04-2018</a:t>
+              <a:t>04-11-2018</a:t>
             </a:fld>
             <a:endParaRPr lang="da-DK"/>
           </a:p>
@@ -2373,7 +2373,7 @@
           <a:p>
             <a:fld id="{E15B7D8E-2A20-4C0E-991C-872DBB7459A8}" type="datetimeFigureOut">
               <a:rPr lang="da-DK" smtClean="0"/>
-              <a:t>17-04-2018</a:t>
+              <a:t>04-11-2018</a:t>
             </a:fld>
             <a:endParaRPr lang="da-DK"/>
           </a:p>
@@ -2586,7 +2586,7 @@
           <a:p>
             <a:fld id="{E15B7D8E-2A20-4C0E-991C-872DBB7459A8}" type="datetimeFigureOut">
               <a:rPr lang="da-DK" smtClean="0"/>
-              <a:t>17-04-2018</a:t>
+              <a:t>04-11-2018</a:t>
             </a:fld>
             <a:endParaRPr lang="da-DK"/>
           </a:p>
@@ -7738,8 +7738,8 @@
         </p:nvSpPr>
         <p:spPr>
           <a:xfrm>
-            <a:off x="838200" y="1825625"/>
-            <a:ext cx="6613358" cy="4351338"/>
+            <a:off x="838199" y="1825625"/>
+            <a:ext cx="7132721" cy="4351338"/>
           </a:xfrm>
         </p:spPr>
         <p:txBody>
@@ -9316,9 +9316,6 @@
               </a:rPr>
               <a:t>(…);</a:t>
             </a:r>
-            <a:endParaRPr lang="da-DK" sz="3600" b="1" smtClean="0">
-              <a:latin typeface="Consolas" panose="020B0609020204030204" pitchFamily="49" charset="0"/>
-            </a:endParaRPr>
           </a:p>
           <a:p>
             <a:r>
@@ -9803,8 +9800,8 @@
         </p:nvSpPr>
         <p:spPr>
           <a:xfrm>
-            <a:off x="838200" y="1825625"/>
-            <a:ext cx="6613358" cy="4351338"/>
+            <a:off x="838199" y="1825625"/>
+            <a:ext cx="7018421" cy="4351338"/>
           </a:xfrm>
         </p:spPr>
         <p:txBody>

</xml_diff>